<commit_message>
Added to PowerPoint Presentation
Added SVR and Tree images to the powerpoint presentation
</commit_message>
<xml_diff>
--- a/Project/presentation_ML.pptx
+++ b/Project/presentation_ML.pptx
@@ -6,10 +6,10 @@
     <p:sldMasterId id="2147483674" r:id="rId2"/>
   </p:sldMasterIdLst>
   <p:notesMasterIdLst>
-    <p:notesMasterId r:id="rId21"/>
+    <p:notesMasterId r:id="rId28"/>
   </p:notesMasterIdLst>
   <p:handoutMasterIdLst>
-    <p:handoutMasterId r:id="rId22"/>
+    <p:handoutMasterId r:id="rId29"/>
   </p:handoutMasterIdLst>
   <p:sldIdLst>
     <p:sldId id="256" r:id="rId3"/>
@@ -29,7 +29,14 @@
     <p:sldId id="283" r:id="rId17"/>
     <p:sldId id="284" r:id="rId18"/>
     <p:sldId id="285" r:id="rId19"/>
-    <p:sldId id="270" r:id="rId20"/>
+    <p:sldId id="286" r:id="rId20"/>
+    <p:sldId id="287" r:id="rId21"/>
+    <p:sldId id="288" r:id="rId22"/>
+    <p:sldId id="289" r:id="rId23"/>
+    <p:sldId id="290" r:id="rId24"/>
+    <p:sldId id="291" r:id="rId25"/>
+    <p:sldId id="292" r:id="rId26"/>
+    <p:sldId id="270" r:id="rId27"/>
   </p:sldIdLst>
   <p:sldSz cx="7315200" cy="4114800"/>
   <p:notesSz cx="6797675" cy="9926638"/>
@@ -128,6 +135,14 @@
       </a:defRPr>
     </a:lvl9pPr>
   </p:defaultTextStyle>
+  <p:extLst>
+    <p:ext uri="{EFAFB233-063F-42B5-8137-9DF3F51BA10A}">
+      <p15:sldGuideLst xmlns:p15="http://schemas.microsoft.com/office/powerpoint/2012/main"/>
+    </p:ext>
+    <p:ext uri="{2D200454-40CA-4A62-9FC3-DE9A4176ACB9}">
+      <p15:notesGuideLst xmlns:p15="http://schemas.microsoft.com/office/powerpoint/2012/main"/>
+    </p:ext>
+  </p:extLst>
 </p:presentation>
 </file>
 
@@ -6657,116 +6672,321 @@
       </p:grpSpPr>
       <p:sp>
         <p:nvSpPr>
-          <p:cNvPr id="182" name="CustomShape 1"/>
-          <p:cNvSpPr/>
-          <p:nvPr/>
-        </p:nvSpPr>
-        <p:spPr>
-          <a:xfrm>
-            <a:off x="417240" y="1841400"/>
-            <a:ext cx="6336360" cy="685440"/>
-          </a:xfrm>
-          <a:prstGeom prst="rect">
-            <a:avLst/>
-          </a:prstGeom>
-          <a:noFill/>
-          <a:ln w="0">
-            <a:noFill/>
-          </a:ln>
-        </p:spPr>
-        <p:style>
-          <a:lnRef idx="0">
-            <a:scrgbClr r="0" g="0" b="0"/>
-          </a:lnRef>
-          <a:fillRef idx="0">
-            <a:scrgbClr r="0" g="0" b="0"/>
-          </a:fillRef>
-          <a:effectRef idx="0">
-            <a:scrgbClr r="0" g="0" b="0"/>
-          </a:effectRef>
-          <a:fontRef idx="minor"/>
-        </p:style>
-        <p:txBody>
-          <a:bodyPr lIns="90000" tIns="45000" rIns="90000" bIns="45000">
-            <a:noAutofit/>
-          </a:bodyPr>
-          <a:lstStyle/>
-          <a:p>
-            <a:pPr algn="ctr">
-              <a:lnSpc>
-                <a:spcPct val="100000"/>
-              </a:lnSpc>
-            </a:pPr>
-            <a:r>
-              <a:rPr lang="en-US" sz="2400" b="1" strike="noStrike" spc="-1">
-                <a:solidFill>
-                  <a:srgbClr val="1FB47C"/>
-                </a:solidFill>
-                <a:latin typeface="Arial"/>
-              </a:rPr>
-              <a:t>Thank you! </a:t>
-            </a:r>
-            <a:endParaRPr lang="en-US" sz="2400" b="0" strike="noStrike" spc="-1">
-              <a:latin typeface="Arial"/>
-            </a:endParaRPr>
-          </a:p>
-        </p:txBody>
-      </p:sp>
-      <p:sp>
-        <p:nvSpPr>
-          <p:cNvPr id="2" name="Rectangle 1">
+          <p:cNvPr id="2" name="Title 1">
             <a:extLst>
               <a:ext uri="{FF2B5EF4-FFF2-40B4-BE49-F238E27FC236}">
-                <a16:creationId xmlns:a16="http://schemas.microsoft.com/office/drawing/2014/main" id="{2515AA8B-A52B-4108-AFC4-F3F079618FF7}"/>
+                <a16:creationId xmlns:a16="http://schemas.microsoft.com/office/drawing/2014/main" id="{A77667F7-C2EB-4234-B396-2A9D5C353501}"/>
               </a:ext>
             </a:extLst>
           </p:cNvPr>
-          <p:cNvSpPr/>
+          <p:cNvSpPr>
+            <a:spLocks noGrp="1"/>
+          </p:cNvSpPr>
+          <p:nvPr>
+            <p:ph type="title"/>
+          </p:nvPr>
+        </p:nvSpPr>
+        <p:spPr>
+          <a:xfrm>
+            <a:off x="679658" y="170597"/>
+            <a:ext cx="6212461" cy="539087"/>
+          </a:xfrm>
+          <a:solidFill>
+            <a:srgbClr val="FFFFFF"/>
+          </a:solidFill>
+        </p:spPr>
+        <p:txBody>
+          <a:bodyPr/>
+          <a:lstStyle/>
+          <a:p>
+            <a:r>
+              <a:rPr lang="en-US" sz="2000" b="1" dirty="0">
+                <a:solidFill>
+                  <a:srgbClr val="00B050"/>
+                </a:solidFill>
+              </a:rPr>
+              <a:t>Trees – Random Forest, Cubist, Gradient Boost</a:t>
+            </a:r>
+            <a:endParaRPr lang="en-US" sz="3200" dirty="0"/>
+          </a:p>
+        </p:txBody>
+      </p:sp>
+      <p:sp>
+        <p:nvSpPr>
+          <p:cNvPr id="3" name="Text Placeholder 2">
+            <a:extLst>
+              <a:ext uri="{FF2B5EF4-FFF2-40B4-BE49-F238E27FC236}">
+                <a16:creationId xmlns:a16="http://schemas.microsoft.com/office/drawing/2014/main" id="{8ECB0728-797B-4274-8038-60BA1DE5CF50}"/>
+              </a:ext>
+            </a:extLst>
+          </p:cNvPr>
+          <p:cNvSpPr>
+            <a:spLocks noGrp="1"/>
+          </p:cNvSpPr>
+          <p:nvPr>
+            <p:ph type="body"/>
+          </p:nvPr>
+        </p:nvSpPr>
+        <p:spPr/>
+        <p:txBody>
+          <a:bodyPr>
+            <a:normAutofit/>
+          </a:bodyPr>
+          <a:lstStyle/>
+          <a:p>
+            <a:pPr marL="0" indent="0">
+              <a:buNone/>
+            </a:pPr>
+            <a:r>
+              <a:rPr lang="en-US" sz="1400" dirty="0">
+                <a:solidFill>
+                  <a:srgbClr val="00B050"/>
+                </a:solidFill>
+              </a:rPr>
+              <a:t>Random Forest </a:t>
+            </a:r>
+          </a:p>
+          <a:p>
+            <a:endParaRPr lang="en-US" sz="1400" dirty="0">
+              <a:solidFill>
+                <a:srgbClr val="00B050"/>
+              </a:solidFill>
+            </a:endParaRPr>
+          </a:p>
+        </p:txBody>
+      </p:sp>
+      <p:sp>
+        <p:nvSpPr>
+          <p:cNvPr id="4" name="Text Placeholder 3">
+            <a:extLst>
+              <a:ext uri="{FF2B5EF4-FFF2-40B4-BE49-F238E27FC236}">
+                <a16:creationId xmlns:a16="http://schemas.microsoft.com/office/drawing/2014/main" id="{E0073D36-7CE8-4E95-ABCE-FBBBBAB50E8A}"/>
+              </a:ext>
+            </a:extLst>
+          </p:cNvPr>
+          <p:cNvSpPr>
+            <a:spLocks noGrp="1"/>
+          </p:cNvSpPr>
+          <p:nvPr>
+            <p:ph type="body"/>
+          </p:nvPr>
+        </p:nvSpPr>
+        <p:spPr/>
+        <p:txBody>
+          <a:bodyPr>
+            <a:normAutofit/>
+          </a:bodyPr>
+          <a:lstStyle/>
+          <a:p>
+            <a:pPr marL="0" indent="0">
+              <a:buNone/>
+            </a:pPr>
+            <a:r>
+              <a:rPr lang="en-US" sz="1400" dirty="0">
+                <a:solidFill>
+                  <a:srgbClr val="00B050"/>
+                </a:solidFill>
+              </a:rPr>
+              <a:t>Random Forest: Food Only</a:t>
+            </a:r>
+          </a:p>
+        </p:txBody>
+      </p:sp>
+      <p:pic>
+        <p:nvPicPr>
+          <p:cNvPr id="6" name="Picture 5">
+            <a:extLst>
+              <a:ext uri="{FF2B5EF4-FFF2-40B4-BE49-F238E27FC236}">
+                <a16:creationId xmlns:a16="http://schemas.microsoft.com/office/drawing/2014/main" id="{80E4683B-1869-4008-B7DB-8DEB347FB14B}"/>
+              </a:ext>
+            </a:extLst>
+          </p:cNvPr>
+          <p:cNvPicPr>
+            <a:picLocks noChangeAspect="1"/>
+          </p:cNvPicPr>
           <p:nvPr/>
-        </p:nvSpPr>
-        <p:spPr>
-          <a:xfrm>
-            <a:off x="5661061" y="82193"/>
-            <a:ext cx="1397285" cy="685440"/>
-          </a:xfrm>
-          <a:prstGeom prst="rect">
-            <a:avLst/>
-          </a:prstGeom>
-          <a:solidFill>
-            <a:schemeClr val="bg1"/>
-          </a:solidFill>
-          <a:ln>
-            <a:solidFill>
-              <a:schemeClr val="bg1"/>
-            </a:solidFill>
-          </a:ln>
-        </p:spPr>
-        <p:style>
-          <a:lnRef idx="2">
-            <a:schemeClr val="accent1">
-              <a:shade val="50000"/>
-            </a:schemeClr>
-          </a:lnRef>
-          <a:fillRef idx="1">
-            <a:schemeClr val="accent1"/>
-          </a:fillRef>
-          <a:effectRef idx="0">
-            <a:schemeClr val="accent1"/>
-          </a:effectRef>
-          <a:fontRef idx="minor">
-            <a:schemeClr val="lt1"/>
-          </a:fontRef>
-        </p:style>
-        <p:txBody>
-          <a:bodyPr rtlCol="0" anchor="ctr"/>
-          <a:lstStyle/>
-          <a:p>
-            <a:pPr algn="ctr"/>
-            <a:endParaRPr lang="en-US"/>
-          </a:p>
-        </p:txBody>
-      </p:sp>
+        </p:nvPicPr>
+        <p:blipFill>
+          <a:blip r:embed="rId2"/>
+          <a:stretch>
+            <a:fillRect/>
+          </a:stretch>
+        </p:blipFill>
+        <p:spPr>
+          <a:xfrm>
+            <a:off x="219409" y="1268622"/>
+            <a:ext cx="3028758" cy="1883538"/>
+          </a:xfrm>
+          <a:prstGeom prst="rect">
+            <a:avLst/>
+          </a:prstGeom>
+        </p:spPr>
+      </p:pic>
+      <p:pic>
+        <p:nvPicPr>
+          <p:cNvPr id="8" name="Picture 7">
+            <a:extLst>
+              <a:ext uri="{FF2B5EF4-FFF2-40B4-BE49-F238E27FC236}">
+                <a16:creationId xmlns:a16="http://schemas.microsoft.com/office/drawing/2014/main" id="{2F9E0B4D-57B1-4F92-95E7-4DEBEE65F3A3}"/>
+              </a:ext>
+            </a:extLst>
+          </p:cNvPr>
+          <p:cNvPicPr>
+            <a:picLocks noChangeAspect="1"/>
+          </p:cNvPicPr>
+          <p:nvPr/>
+        </p:nvPicPr>
+        <p:blipFill>
+          <a:blip r:embed="rId3"/>
+          <a:stretch>
+            <a:fillRect/>
+          </a:stretch>
+        </p:blipFill>
+        <p:spPr>
+          <a:xfrm>
+            <a:off x="3306201" y="1268622"/>
+            <a:ext cx="3197241" cy="1926395"/>
+          </a:xfrm>
+          <a:prstGeom prst="rect">
+            <a:avLst/>
+          </a:prstGeom>
+        </p:spPr>
+      </p:pic>
     </p:spTree>
+    <p:extLst>
+      <p:ext uri="{BB962C8B-B14F-4D97-AF65-F5344CB8AC3E}">
+        <p14:creationId xmlns:p14="http://schemas.microsoft.com/office/powerpoint/2010/main" val="3240205316"/>
+      </p:ext>
+    </p:extLst>
+  </p:cSld>
+  <p:clrMapOvr>
+    <a:masterClrMapping/>
+  </p:clrMapOvr>
+</p:sld>
+</file>
+
+<file path=ppt/slides/slide19.xml><?xml version="1.0" encoding="utf-8"?>
+<p:sld xmlns:a="http://schemas.openxmlformats.org/drawingml/2006/main" xmlns:r="http://schemas.openxmlformats.org/officeDocument/2006/relationships" xmlns:p="http://schemas.openxmlformats.org/presentationml/2006/main">
+  <p:cSld>
+    <p:spTree>
+      <p:nvGrpSpPr>
+        <p:cNvPr id="1" name=""/>
+        <p:cNvGrpSpPr/>
+        <p:nvPr/>
+      </p:nvGrpSpPr>
+      <p:grpSpPr>
+        <a:xfrm>
+          <a:off x="0" y="0"/>
+          <a:ext cx="0" cy="0"/>
+          <a:chOff x="0" y="0"/>
+          <a:chExt cx="0" cy="0"/>
+        </a:xfrm>
+      </p:grpSpPr>
+      <p:sp>
+        <p:nvSpPr>
+          <p:cNvPr id="2" name="TextBox 1">
+            <a:extLst>
+              <a:ext uri="{FF2B5EF4-FFF2-40B4-BE49-F238E27FC236}">
+                <a16:creationId xmlns:a16="http://schemas.microsoft.com/office/drawing/2014/main" id="{D23D90C7-5F60-4B10-88B2-9F287F636B74}"/>
+              </a:ext>
+            </a:extLst>
+          </p:cNvPr>
+          <p:cNvSpPr txBox="1"/>
+          <p:nvPr/>
+        </p:nvSpPr>
+        <p:spPr>
+          <a:xfrm>
+            <a:off x="2883089" y="197893"/>
+            <a:ext cx="1549021" cy="400110"/>
+          </a:xfrm>
+          <a:prstGeom prst="rect">
+            <a:avLst/>
+          </a:prstGeom>
+          <a:noFill/>
+        </p:spPr>
+        <p:txBody>
+          <a:bodyPr wrap="square" rtlCol="0">
+            <a:spAutoFit/>
+          </a:bodyPr>
+          <a:lstStyle/>
+          <a:p>
+            <a:r>
+              <a:rPr lang="en-US" sz="2000" b="1" dirty="0">
+                <a:solidFill>
+                  <a:srgbClr val="00B050"/>
+                </a:solidFill>
+              </a:rPr>
+              <a:t>Cubist</a:t>
+            </a:r>
+          </a:p>
+        </p:txBody>
+      </p:sp>
+      <p:pic>
+        <p:nvPicPr>
+          <p:cNvPr id="4" name="Picture 3">
+            <a:extLst>
+              <a:ext uri="{FF2B5EF4-FFF2-40B4-BE49-F238E27FC236}">
+                <a16:creationId xmlns:a16="http://schemas.microsoft.com/office/drawing/2014/main" id="{9FDC98C8-F628-4A11-8598-B769F3E4594C}"/>
+              </a:ext>
+            </a:extLst>
+          </p:cNvPr>
+          <p:cNvPicPr>
+            <a:picLocks noChangeAspect="1"/>
+          </p:cNvPicPr>
+          <p:nvPr/>
+        </p:nvPicPr>
+        <p:blipFill>
+          <a:blip r:embed="rId2"/>
+          <a:stretch>
+            <a:fillRect/>
+          </a:stretch>
+        </p:blipFill>
+        <p:spPr>
+          <a:xfrm>
+            <a:off x="0" y="746066"/>
+            <a:ext cx="3280957" cy="2231409"/>
+          </a:xfrm>
+          <a:prstGeom prst="rect">
+            <a:avLst/>
+          </a:prstGeom>
+        </p:spPr>
+      </p:pic>
+      <p:pic>
+        <p:nvPicPr>
+          <p:cNvPr id="6" name="Picture 5">
+            <a:extLst>
+              <a:ext uri="{FF2B5EF4-FFF2-40B4-BE49-F238E27FC236}">
+                <a16:creationId xmlns:a16="http://schemas.microsoft.com/office/drawing/2014/main" id="{B1C4121C-645F-4E50-9661-A6222824DC98}"/>
+              </a:ext>
+            </a:extLst>
+          </p:cNvPr>
+          <p:cNvPicPr>
+            <a:picLocks noChangeAspect="1"/>
+          </p:cNvPicPr>
+          <p:nvPr/>
+        </p:nvPicPr>
+        <p:blipFill>
+          <a:blip r:embed="rId3"/>
+          <a:stretch>
+            <a:fillRect/>
+          </a:stretch>
+        </p:blipFill>
+        <p:spPr>
+          <a:xfrm>
+            <a:off x="3152633" y="598003"/>
+            <a:ext cx="4050505" cy="2527537"/>
+          </a:xfrm>
+          <a:prstGeom prst="rect">
+            <a:avLst/>
+          </a:prstGeom>
+        </p:spPr>
+      </p:pic>
+    </p:spTree>
+    <p:extLst>
+      <p:ext uri="{BB962C8B-B14F-4D97-AF65-F5344CB8AC3E}">
+        <p14:creationId xmlns:p14="http://schemas.microsoft.com/office/powerpoint/2010/main" val="3835689230"/>
+      </p:ext>
+    </p:extLst>
   </p:cSld>
   <p:clrMapOvr>
     <a:masterClrMapping/>
@@ -7029,7 +7249,7 @@
         </p:blipFill>
         <p:spPr>
           <a:xfrm>
-            <a:off x="5072706" y="2352782"/>
+            <a:off x="4679600" y="761400"/>
             <a:ext cx="2242494" cy="1495615"/>
           </a:xfrm>
           <a:prstGeom prst="rect">
@@ -7037,6 +7257,998 @@
           </a:prstGeom>
         </p:spPr>
       </p:pic>
+    </p:spTree>
+  </p:cSld>
+  <p:clrMapOvr>
+    <a:masterClrMapping/>
+  </p:clrMapOvr>
+</p:sld>
+</file>
+
+<file path=ppt/slides/slide20.xml><?xml version="1.0" encoding="utf-8"?>
+<p:sld xmlns:a="http://schemas.openxmlformats.org/drawingml/2006/main" xmlns:r="http://schemas.openxmlformats.org/officeDocument/2006/relationships" xmlns:p="http://schemas.openxmlformats.org/presentationml/2006/main">
+  <p:cSld>
+    <p:spTree>
+      <p:nvGrpSpPr>
+        <p:cNvPr id="1" name=""/>
+        <p:cNvGrpSpPr/>
+        <p:nvPr/>
+      </p:nvGrpSpPr>
+      <p:grpSpPr>
+        <a:xfrm>
+          <a:off x="0" y="0"/>
+          <a:ext cx="0" cy="0"/>
+          <a:chOff x="0" y="0"/>
+          <a:chExt cx="0" cy="0"/>
+        </a:xfrm>
+      </p:grpSpPr>
+      <p:pic>
+        <p:nvPicPr>
+          <p:cNvPr id="11" name="Picture 10">
+            <a:extLst>
+              <a:ext uri="{FF2B5EF4-FFF2-40B4-BE49-F238E27FC236}">
+                <a16:creationId xmlns:a16="http://schemas.microsoft.com/office/drawing/2014/main" id="{2F8AF598-6ED2-4212-ABE7-8BB896D5C618}"/>
+              </a:ext>
+            </a:extLst>
+          </p:cNvPr>
+          <p:cNvPicPr>
+            <a:picLocks noChangeAspect="1"/>
+          </p:cNvPicPr>
+          <p:nvPr/>
+        </p:nvPicPr>
+        <p:blipFill>
+          <a:blip r:embed="rId2"/>
+          <a:stretch>
+            <a:fillRect/>
+          </a:stretch>
+        </p:blipFill>
+        <p:spPr>
+          <a:xfrm>
+            <a:off x="3889612" y="343259"/>
+            <a:ext cx="3114419" cy="1751075"/>
+          </a:xfrm>
+          <a:prstGeom prst="rect">
+            <a:avLst/>
+          </a:prstGeom>
+        </p:spPr>
+      </p:pic>
+      <p:sp>
+        <p:nvSpPr>
+          <p:cNvPr id="2" name="Title 1">
+            <a:extLst>
+              <a:ext uri="{FF2B5EF4-FFF2-40B4-BE49-F238E27FC236}">
+                <a16:creationId xmlns:a16="http://schemas.microsoft.com/office/drawing/2014/main" id="{67B4E60A-EAD1-4E21-B807-D8E939638F96}"/>
+              </a:ext>
+            </a:extLst>
+          </p:cNvPr>
+          <p:cNvSpPr>
+            <a:spLocks noGrp="1"/>
+          </p:cNvSpPr>
+          <p:nvPr>
+            <p:ph type="title"/>
+          </p:nvPr>
+        </p:nvSpPr>
+        <p:spPr>
+          <a:xfrm>
+            <a:off x="365940" y="0"/>
+            <a:ext cx="6583320" cy="552734"/>
+          </a:xfrm>
+        </p:spPr>
+        <p:txBody>
+          <a:bodyPr/>
+          <a:lstStyle/>
+          <a:p>
+            <a:pPr algn="ctr"/>
+            <a:r>
+              <a:rPr lang="en-US" sz="2000" b="1" dirty="0">
+                <a:solidFill>
+                  <a:srgbClr val="00B050"/>
+                </a:solidFill>
+              </a:rPr>
+              <a:t>Gradient Boost</a:t>
+            </a:r>
+          </a:p>
+        </p:txBody>
+      </p:sp>
+      <p:pic>
+        <p:nvPicPr>
+          <p:cNvPr id="7" name="Picture 6">
+            <a:extLst>
+              <a:ext uri="{FF2B5EF4-FFF2-40B4-BE49-F238E27FC236}">
+                <a16:creationId xmlns:a16="http://schemas.microsoft.com/office/drawing/2014/main" id="{83795C57-C275-4FA0-A587-B24D8594BE75}"/>
+              </a:ext>
+            </a:extLst>
+          </p:cNvPr>
+          <p:cNvPicPr>
+            <a:picLocks noChangeAspect="1"/>
+          </p:cNvPicPr>
+          <p:nvPr/>
+        </p:nvPicPr>
+        <p:blipFill>
+          <a:blip r:embed="rId3"/>
+          <a:stretch>
+            <a:fillRect/>
+          </a:stretch>
+        </p:blipFill>
+        <p:spPr>
+          <a:xfrm>
+            <a:off x="200735" y="445231"/>
+            <a:ext cx="2556113" cy="1649104"/>
+          </a:xfrm>
+          <a:prstGeom prst="rect">
+            <a:avLst/>
+          </a:prstGeom>
+        </p:spPr>
+      </p:pic>
+      <p:pic>
+        <p:nvPicPr>
+          <p:cNvPr id="9" name="Picture 8">
+            <a:extLst>
+              <a:ext uri="{FF2B5EF4-FFF2-40B4-BE49-F238E27FC236}">
+                <a16:creationId xmlns:a16="http://schemas.microsoft.com/office/drawing/2014/main" id="{AC3604C0-0DBF-4221-85D1-3532DD361498}"/>
+              </a:ext>
+            </a:extLst>
+          </p:cNvPr>
+          <p:cNvPicPr>
+            <a:picLocks noChangeAspect="1"/>
+          </p:cNvPicPr>
+          <p:nvPr/>
+        </p:nvPicPr>
+        <p:blipFill>
+          <a:blip r:embed="rId4"/>
+          <a:stretch>
+            <a:fillRect/>
+          </a:stretch>
+        </p:blipFill>
+        <p:spPr>
+          <a:xfrm>
+            <a:off x="311169" y="2094335"/>
+            <a:ext cx="2288730" cy="1827124"/>
+          </a:xfrm>
+          <a:prstGeom prst="rect">
+            <a:avLst/>
+          </a:prstGeom>
+        </p:spPr>
+      </p:pic>
+      <p:pic>
+        <p:nvPicPr>
+          <p:cNvPr id="13" name="Picture 12">
+            <a:extLst>
+              <a:ext uri="{FF2B5EF4-FFF2-40B4-BE49-F238E27FC236}">
+                <a16:creationId xmlns:a16="http://schemas.microsoft.com/office/drawing/2014/main" id="{C5C86091-E42B-4DC5-9B1E-7CF1D772192E}"/>
+              </a:ext>
+            </a:extLst>
+          </p:cNvPr>
+          <p:cNvPicPr>
+            <a:picLocks noChangeAspect="1"/>
+          </p:cNvPicPr>
+          <p:nvPr/>
+        </p:nvPicPr>
+        <p:blipFill>
+          <a:blip r:embed="rId5"/>
+          <a:stretch>
+            <a:fillRect/>
+          </a:stretch>
+        </p:blipFill>
+        <p:spPr>
+          <a:xfrm>
+            <a:off x="3746309" y="2094334"/>
+            <a:ext cx="3368156" cy="1827124"/>
+          </a:xfrm>
+          <a:prstGeom prst="rect">
+            <a:avLst/>
+          </a:prstGeom>
+        </p:spPr>
+      </p:pic>
+    </p:spTree>
+    <p:extLst>
+      <p:ext uri="{BB962C8B-B14F-4D97-AF65-F5344CB8AC3E}">
+        <p14:creationId xmlns:p14="http://schemas.microsoft.com/office/powerpoint/2010/main" val="427494538"/>
+      </p:ext>
+    </p:extLst>
+  </p:cSld>
+  <p:clrMapOvr>
+    <a:masterClrMapping/>
+  </p:clrMapOvr>
+</p:sld>
+</file>
+
+<file path=ppt/slides/slide21.xml><?xml version="1.0" encoding="utf-8"?>
+<p:sld xmlns:a="http://schemas.openxmlformats.org/drawingml/2006/main" xmlns:r="http://schemas.openxmlformats.org/officeDocument/2006/relationships" xmlns:p="http://schemas.openxmlformats.org/presentationml/2006/main">
+  <p:cSld>
+    <p:spTree>
+      <p:nvGrpSpPr>
+        <p:cNvPr id="1" name=""/>
+        <p:cNvGrpSpPr/>
+        <p:nvPr/>
+      </p:nvGrpSpPr>
+      <p:grpSpPr>
+        <a:xfrm>
+          <a:off x="0" y="0"/>
+          <a:ext cx="0" cy="0"/>
+          <a:chOff x="0" y="0"/>
+          <a:chExt cx="0" cy="0"/>
+        </a:xfrm>
+      </p:grpSpPr>
+      <p:sp>
+        <p:nvSpPr>
+          <p:cNvPr id="2" name="TextBox 1">
+            <a:extLst>
+              <a:ext uri="{FF2B5EF4-FFF2-40B4-BE49-F238E27FC236}">
+                <a16:creationId xmlns:a16="http://schemas.microsoft.com/office/drawing/2014/main" id="{FD8E1873-6D87-408F-B270-6A08AB462141}"/>
+              </a:ext>
+            </a:extLst>
+          </p:cNvPr>
+          <p:cNvSpPr txBox="1"/>
+          <p:nvPr/>
+        </p:nvSpPr>
+        <p:spPr>
+          <a:xfrm>
+            <a:off x="1289713" y="102358"/>
+            <a:ext cx="4810836" cy="400110"/>
+          </a:xfrm>
+          <a:prstGeom prst="rect">
+            <a:avLst/>
+          </a:prstGeom>
+          <a:noFill/>
+        </p:spPr>
+        <p:txBody>
+          <a:bodyPr wrap="square" rtlCol="0">
+            <a:spAutoFit/>
+          </a:bodyPr>
+          <a:lstStyle/>
+          <a:p>
+            <a:pPr algn="ctr"/>
+            <a:r>
+              <a:rPr lang="en-US" sz="2000" b="1" dirty="0">
+                <a:solidFill>
+                  <a:srgbClr val="00B050"/>
+                </a:solidFill>
+              </a:rPr>
+              <a:t>Tree Prediction Results</a:t>
+            </a:r>
+          </a:p>
+        </p:txBody>
+      </p:sp>
+      <p:pic>
+        <p:nvPicPr>
+          <p:cNvPr id="4" name="Picture 3">
+            <a:extLst>
+              <a:ext uri="{FF2B5EF4-FFF2-40B4-BE49-F238E27FC236}">
+                <a16:creationId xmlns:a16="http://schemas.microsoft.com/office/drawing/2014/main" id="{7D2CC077-1564-4C96-9D23-80E9820A21BB}"/>
+              </a:ext>
+            </a:extLst>
+          </p:cNvPr>
+          <p:cNvPicPr>
+            <a:picLocks noChangeAspect="1"/>
+          </p:cNvPicPr>
+          <p:nvPr/>
+        </p:nvPicPr>
+        <p:blipFill>
+          <a:blip r:embed="rId2"/>
+          <a:stretch>
+            <a:fillRect/>
+          </a:stretch>
+        </p:blipFill>
+        <p:spPr>
+          <a:xfrm>
+            <a:off x="461962" y="742736"/>
+            <a:ext cx="6391275" cy="1314664"/>
+          </a:xfrm>
+          <a:prstGeom prst="rect">
+            <a:avLst/>
+          </a:prstGeom>
+        </p:spPr>
+      </p:pic>
+      <p:pic>
+        <p:nvPicPr>
+          <p:cNvPr id="6" name="Picture 5">
+            <a:extLst>
+              <a:ext uri="{FF2B5EF4-FFF2-40B4-BE49-F238E27FC236}">
+                <a16:creationId xmlns:a16="http://schemas.microsoft.com/office/drawing/2014/main" id="{BD8E2CBC-3834-4C49-975D-8E955A17E26C}"/>
+              </a:ext>
+            </a:extLst>
+          </p:cNvPr>
+          <p:cNvPicPr>
+            <a:picLocks noChangeAspect="1"/>
+          </p:cNvPicPr>
+          <p:nvPr/>
+        </p:nvPicPr>
+        <p:blipFill>
+          <a:blip r:embed="rId3"/>
+          <a:stretch>
+            <a:fillRect/>
+          </a:stretch>
+        </p:blipFill>
+        <p:spPr>
+          <a:xfrm>
+            <a:off x="499493" y="2400513"/>
+            <a:ext cx="6391275" cy="1093313"/>
+          </a:xfrm>
+          <a:prstGeom prst="rect">
+            <a:avLst/>
+          </a:prstGeom>
+        </p:spPr>
+      </p:pic>
+    </p:spTree>
+    <p:extLst>
+      <p:ext uri="{BB962C8B-B14F-4D97-AF65-F5344CB8AC3E}">
+        <p14:creationId xmlns:p14="http://schemas.microsoft.com/office/powerpoint/2010/main" val="3880920490"/>
+      </p:ext>
+    </p:extLst>
+  </p:cSld>
+  <p:clrMapOvr>
+    <a:masterClrMapping/>
+  </p:clrMapOvr>
+</p:sld>
+</file>
+
+<file path=ppt/slides/slide22.xml><?xml version="1.0" encoding="utf-8"?>
+<p:sld xmlns:a="http://schemas.openxmlformats.org/drawingml/2006/main" xmlns:r="http://schemas.openxmlformats.org/officeDocument/2006/relationships" xmlns:p="http://schemas.openxmlformats.org/presentationml/2006/main">
+  <p:cSld>
+    <p:spTree>
+      <p:nvGrpSpPr>
+        <p:cNvPr id="1" name=""/>
+        <p:cNvGrpSpPr/>
+        <p:nvPr/>
+      </p:nvGrpSpPr>
+      <p:grpSpPr>
+        <a:xfrm>
+          <a:off x="0" y="0"/>
+          <a:ext cx="0" cy="0"/>
+          <a:chOff x="0" y="0"/>
+          <a:chExt cx="0" cy="0"/>
+        </a:xfrm>
+      </p:grpSpPr>
+      <p:pic>
+        <p:nvPicPr>
+          <p:cNvPr id="4" name="Picture 3">
+            <a:extLst>
+              <a:ext uri="{FF2B5EF4-FFF2-40B4-BE49-F238E27FC236}">
+                <a16:creationId xmlns:a16="http://schemas.microsoft.com/office/drawing/2014/main" id="{26E173C0-B5A5-46C4-A6D3-39151696A492}"/>
+              </a:ext>
+            </a:extLst>
+          </p:cNvPr>
+          <p:cNvPicPr>
+            <a:picLocks noChangeAspect="1"/>
+          </p:cNvPicPr>
+          <p:nvPr/>
+        </p:nvPicPr>
+        <p:blipFill>
+          <a:blip r:embed="rId2"/>
+          <a:stretch>
+            <a:fillRect/>
+          </a:stretch>
+        </p:blipFill>
+        <p:spPr>
+          <a:xfrm>
+            <a:off x="0" y="406586"/>
+            <a:ext cx="4039737" cy="2978059"/>
+          </a:xfrm>
+          <a:prstGeom prst="rect">
+            <a:avLst/>
+          </a:prstGeom>
+        </p:spPr>
+      </p:pic>
+      <p:sp>
+        <p:nvSpPr>
+          <p:cNvPr id="2" name="TextBox 1">
+            <a:extLst>
+              <a:ext uri="{FF2B5EF4-FFF2-40B4-BE49-F238E27FC236}">
+                <a16:creationId xmlns:a16="http://schemas.microsoft.com/office/drawing/2014/main" id="{2ACACA4E-5861-46B2-85AB-DB2F99AD458E}"/>
+              </a:ext>
+            </a:extLst>
+          </p:cNvPr>
+          <p:cNvSpPr txBox="1"/>
+          <p:nvPr/>
+        </p:nvSpPr>
+        <p:spPr>
+          <a:xfrm>
+            <a:off x="1531961" y="22245"/>
+            <a:ext cx="4251278" cy="400110"/>
+          </a:xfrm>
+          <a:prstGeom prst="rect">
+            <a:avLst/>
+          </a:prstGeom>
+          <a:noFill/>
+        </p:spPr>
+        <p:txBody>
+          <a:bodyPr wrap="square" rtlCol="0">
+            <a:spAutoFit/>
+          </a:bodyPr>
+          <a:lstStyle/>
+          <a:p>
+            <a:r>
+              <a:rPr lang="en-US" sz="2000" b="1" dirty="0">
+                <a:solidFill>
+                  <a:srgbClr val="00B050"/>
+                </a:solidFill>
+              </a:rPr>
+              <a:t>Support Vector Regression Plots</a:t>
+            </a:r>
+          </a:p>
+        </p:txBody>
+      </p:sp>
+      <p:pic>
+        <p:nvPicPr>
+          <p:cNvPr id="8" name="Picture 7">
+            <a:extLst>
+              <a:ext uri="{FF2B5EF4-FFF2-40B4-BE49-F238E27FC236}">
+                <a16:creationId xmlns:a16="http://schemas.microsoft.com/office/drawing/2014/main" id="{19A98E00-4971-454E-8FFC-E65B0D1FE23C}"/>
+              </a:ext>
+            </a:extLst>
+          </p:cNvPr>
+          <p:cNvPicPr>
+            <a:picLocks noChangeAspect="1"/>
+          </p:cNvPicPr>
+          <p:nvPr/>
+        </p:nvPicPr>
+        <p:blipFill>
+          <a:blip r:embed="rId3"/>
+          <a:stretch>
+            <a:fillRect/>
+          </a:stretch>
+        </p:blipFill>
+        <p:spPr>
+          <a:xfrm>
+            <a:off x="4925704" y="2789330"/>
+            <a:ext cx="1344304" cy="513429"/>
+          </a:xfrm>
+          <a:prstGeom prst="rect">
+            <a:avLst/>
+          </a:prstGeom>
+        </p:spPr>
+      </p:pic>
+      <p:pic>
+        <p:nvPicPr>
+          <p:cNvPr id="6" name="Picture 5">
+            <a:extLst>
+              <a:ext uri="{FF2B5EF4-FFF2-40B4-BE49-F238E27FC236}">
+                <a16:creationId xmlns:a16="http://schemas.microsoft.com/office/drawing/2014/main" id="{9429D09F-A458-4EFD-B990-80911CE6CFCA}"/>
+              </a:ext>
+            </a:extLst>
+          </p:cNvPr>
+          <p:cNvPicPr>
+            <a:picLocks noChangeAspect="1"/>
+          </p:cNvPicPr>
+          <p:nvPr/>
+        </p:nvPicPr>
+        <p:blipFill>
+          <a:blip r:embed="rId4"/>
+          <a:stretch>
+            <a:fillRect/>
+          </a:stretch>
+        </p:blipFill>
+        <p:spPr>
+          <a:xfrm>
+            <a:off x="3421117" y="386113"/>
+            <a:ext cx="3734859" cy="2039349"/>
+          </a:xfrm>
+          <a:prstGeom prst="rect">
+            <a:avLst/>
+          </a:prstGeom>
+        </p:spPr>
+      </p:pic>
+    </p:spTree>
+    <p:extLst>
+      <p:ext uri="{BB962C8B-B14F-4D97-AF65-F5344CB8AC3E}">
+        <p14:creationId xmlns:p14="http://schemas.microsoft.com/office/powerpoint/2010/main" val="1157384874"/>
+      </p:ext>
+    </p:extLst>
+  </p:cSld>
+  <p:clrMapOvr>
+    <a:masterClrMapping/>
+  </p:clrMapOvr>
+</p:sld>
+</file>
+
+<file path=ppt/slides/slide23.xml><?xml version="1.0" encoding="utf-8"?>
+<p:sld xmlns:a="http://schemas.openxmlformats.org/drawingml/2006/main" xmlns:r="http://schemas.openxmlformats.org/officeDocument/2006/relationships" xmlns:p="http://schemas.openxmlformats.org/presentationml/2006/main">
+  <p:cSld>
+    <p:spTree>
+      <p:nvGrpSpPr>
+        <p:cNvPr id="1" name=""/>
+        <p:cNvGrpSpPr/>
+        <p:nvPr/>
+      </p:nvGrpSpPr>
+      <p:grpSpPr>
+        <a:xfrm>
+          <a:off x="0" y="0"/>
+          <a:ext cx="0" cy="0"/>
+          <a:chOff x="0" y="0"/>
+          <a:chExt cx="0" cy="0"/>
+        </a:xfrm>
+      </p:grpSpPr>
+      <p:sp>
+        <p:nvSpPr>
+          <p:cNvPr id="2" name="TextBox 1">
+            <a:extLst>
+              <a:ext uri="{FF2B5EF4-FFF2-40B4-BE49-F238E27FC236}">
+                <a16:creationId xmlns:a16="http://schemas.microsoft.com/office/drawing/2014/main" id="{84177547-168F-45B2-AD24-21F4062413AE}"/>
+              </a:ext>
+            </a:extLst>
+          </p:cNvPr>
+          <p:cNvSpPr txBox="1"/>
+          <p:nvPr/>
+        </p:nvSpPr>
+        <p:spPr>
+          <a:xfrm>
+            <a:off x="1589963" y="150125"/>
+            <a:ext cx="4039738" cy="400110"/>
+          </a:xfrm>
+          <a:prstGeom prst="rect">
+            <a:avLst/>
+          </a:prstGeom>
+          <a:noFill/>
+        </p:spPr>
+        <p:txBody>
+          <a:bodyPr wrap="square" rtlCol="0">
+            <a:spAutoFit/>
+          </a:bodyPr>
+          <a:lstStyle/>
+          <a:p>
+            <a:pPr algn="ctr"/>
+            <a:r>
+              <a:rPr lang="en-US" sz="2000" b="1" dirty="0">
+                <a:solidFill>
+                  <a:srgbClr val="00B050"/>
+                </a:solidFill>
+              </a:rPr>
+              <a:t>Tuned Grid Plots</a:t>
+            </a:r>
+          </a:p>
+        </p:txBody>
+      </p:sp>
+      <p:pic>
+        <p:nvPicPr>
+          <p:cNvPr id="4" name="Picture 3">
+            <a:extLst>
+              <a:ext uri="{FF2B5EF4-FFF2-40B4-BE49-F238E27FC236}">
+                <a16:creationId xmlns:a16="http://schemas.microsoft.com/office/drawing/2014/main" id="{F45C2F87-47F5-4617-B2E5-8336F8CE13C5}"/>
+              </a:ext>
+            </a:extLst>
+          </p:cNvPr>
+          <p:cNvPicPr>
+            <a:picLocks noChangeAspect="1"/>
+          </p:cNvPicPr>
+          <p:nvPr/>
+        </p:nvPicPr>
+        <p:blipFill>
+          <a:blip r:embed="rId2"/>
+          <a:stretch>
+            <a:fillRect/>
+          </a:stretch>
+        </p:blipFill>
+        <p:spPr>
+          <a:xfrm>
+            <a:off x="186647" y="641446"/>
+            <a:ext cx="3375410" cy="2279176"/>
+          </a:xfrm>
+          <a:prstGeom prst="rect">
+            <a:avLst/>
+          </a:prstGeom>
+        </p:spPr>
+      </p:pic>
+      <p:pic>
+        <p:nvPicPr>
+          <p:cNvPr id="6" name="Picture 5">
+            <a:extLst>
+              <a:ext uri="{FF2B5EF4-FFF2-40B4-BE49-F238E27FC236}">
+                <a16:creationId xmlns:a16="http://schemas.microsoft.com/office/drawing/2014/main" id="{542844D3-4ABB-4965-9FE9-62841690D5B2}"/>
+              </a:ext>
+            </a:extLst>
+          </p:cNvPr>
+          <p:cNvPicPr>
+            <a:picLocks noChangeAspect="1"/>
+          </p:cNvPicPr>
+          <p:nvPr/>
+        </p:nvPicPr>
+        <p:blipFill>
+          <a:blip r:embed="rId3"/>
+          <a:stretch>
+            <a:fillRect/>
+          </a:stretch>
+        </p:blipFill>
+        <p:spPr>
+          <a:xfrm>
+            <a:off x="3562057" y="718154"/>
+            <a:ext cx="3553290" cy="2173246"/>
+          </a:xfrm>
+          <a:prstGeom prst="rect">
+            <a:avLst/>
+          </a:prstGeom>
+        </p:spPr>
+      </p:pic>
+    </p:spTree>
+    <p:extLst>
+      <p:ext uri="{BB962C8B-B14F-4D97-AF65-F5344CB8AC3E}">
+        <p14:creationId xmlns:p14="http://schemas.microsoft.com/office/powerpoint/2010/main" val="1095362791"/>
+      </p:ext>
+    </p:extLst>
+  </p:cSld>
+  <p:clrMapOvr>
+    <a:masterClrMapping/>
+  </p:clrMapOvr>
+</p:sld>
+</file>
+
+<file path=ppt/slides/slide24.xml><?xml version="1.0" encoding="utf-8"?>
+<p:sld xmlns:a="http://schemas.openxmlformats.org/drawingml/2006/main" xmlns:r="http://schemas.openxmlformats.org/officeDocument/2006/relationships" xmlns:p="http://schemas.openxmlformats.org/presentationml/2006/main">
+  <p:cSld>
+    <p:spTree>
+      <p:nvGrpSpPr>
+        <p:cNvPr id="1" name=""/>
+        <p:cNvGrpSpPr/>
+        <p:nvPr/>
+      </p:nvGrpSpPr>
+      <p:grpSpPr>
+        <a:xfrm>
+          <a:off x="0" y="0"/>
+          <a:ext cx="0" cy="0"/>
+          <a:chOff x="0" y="0"/>
+          <a:chExt cx="0" cy="0"/>
+        </a:xfrm>
+      </p:grpSpPr>
+      <p:pic>
+        <p:nvPicPr>
+          <p:cNvPr id="3" name="Picture 2">
+            <a:extLst>
+              <a:ext uri="{FF2B5EF4-FFF2-40B4-BE49-F238E27FC236}">
+                <a16:creationId xmlns:a16="http://schemas.microsoft.com/office/drawing/2014/main" id="{76B89A13-2E6D-4616-9B5A-C9F2EF28E85D}"/>
+              </a:ext>
+            </a:extLst>
+          </p:cNvPr>
+          <p:cNvPicPr>
+            <a:picLocks noChangeAspect="1"/>
+          </p:cNvPicPr>
+          <p:nvPr/>
+        </p:nvPicPr>
+        <p:blipFill>
+          <a:blip r:embed="rId2"/>
+          <a:stretch>
+            <a:fillRect/>
+          </a:stretch>
+        </p:blipFill>
+        <p:spPr>
+          <a:xfrm>
+            <a:off x="183676" y="323565"/>
+            <a:ext cx="2689178" cy="1725890"/>
+          </a:xfrm>
+          <a:prstGeom prst="rect">
+            <a:avLst/>
+          </a:prstGeom>
+        </p:spPr>
+      </p:pic>
+      <p:pic>
+        <p:nvPicPr>
+          <p:cNvPr id="5" name="Picture 4">
+            <a:extLst>
+              <a:ext uri="{FF2B5EF4-FFF2-40B4-BE49-F238E27FC236}">
+                <a16:creationId xmlns:a16="http://schemas.microsoft.com/office/drawing/2014/main" id="{D332BA44-4C9D-4E28-BAEF-4B24C2D87F49}"/>
+              </a:ext>
+            </a:extLst>
+          </p:cNvPr>
+          <p:cNvPicPr>
+            <a:picLocks noChangeAspect="1"/>
+          </p:cNvPicPr>
+          <p:nvPr/>
+        </p:nvPicPr>
+        <p:blipFill>
+          <a:blip r:embed="rId3"/>
+          <a:stretch>
+            <a:fillRect/>
+          </a:stretch>
+        </p:blipFill>
+        <p:spPr>
+          <a:xfrm>
+            <a:off x="2811439" y="453085"/>
+            <a:ext cx="1200821" cy="733425"/>
+          </a:xfrm>
+          <a:prstGeom prst="rect">
+            <a:avLst/>
+          </a:prstGeom>
+        </p:spPr>
+      </p:pic>
+      <p:pic>
+        <p:nvPicPr>
+          <p:cNvPr id="7" name="Picture 6">
+            <a:extLst>
+              <a:ext uri="{FF2B5EF4-FFF2-40B4-BE49-F238E27FC236}">
+                <a16:creationId xmlns:a16="http://schemas.microsoft.com/office/drawing/2014/main" id="{51ABBCB9-0FAE-475A-B158-EFBC29C2B61B}"/>
+              </a:ext>
+            </a:extLst>
+          </p:cNvPr>
+          <p:cNvPicPr>
+            <a:picLocks noChangeAspect="1"/>
+          </p:cNvPicPr>
+          <p:nvPr/>
+        </p:nvPicPr>
+        <p:blipFill>
+          <a:blip r:embed="rId4"/>
+          <a:stretch>
+            <a:fillRect/>
+          </a:stretch>
+        </p:blipFill>
+        <p:spPr>
+          <a:xfrm>
+            <a:off x="4060028" y="453085"/>
+            <a:ext cx="3127864" cy="1382539"/>
+          </a:xfrm>
+          <a:prstGeom prst="rect">
+            <a:avLst/>
+          </a:prstGeom>
+        </p:spPr>
+      </p:pic>
+      <p:pic>
+        <p:nvPicPr>
+          <p:cNvPr id="9" name="Picture 8">
+            <a:extLst>
+              <a:ext uri="{FF2B5EF4-FFF2-40B4-BE49-F238E27FC236}">
+                <a16:creationId xmlns:a16="http://schemas.microsoft.com/office/drawing/2014/main" id="{21CA5E4F-098D-4035-B00B-357EE9ED5F88}"/>
+              </a:ext>
+            </a:extLst>
+          </p:cNvPr>
+          <p:cNvPicPr>
+            <a:picLocks noChangeAspect="1"/>
+          </p:cNvPicPr>
+          <p:nvPr/>
+        </p:nvPicPr>
+        <p:blipFill>
+          <a:blip r:embed="rId5"/>
+          <a:stretch>
+            <a:fillRect/>
+          </a:stretch>
+        </p:blipFill>
+        <p:spPr>
+          <a:xfrm>
+            <a:off x="251943" y="1835624"/>
+            <a:ext cx="2559496" cy="1955611"/>
+          </a:xfrm>
+          <a:prstGeom prst="rect">
+            <a:avLst/>
+          </a:prstGeom>
+        </p:spPr>
+      </p:pic>
+      <p:pic>
+        <p:nvPicPr>
+          <p:cNvPr id="11" name="Picture 10">
+            <a:extLst>
+              <a:ext uri="{FF2B5EF4-FFF2-40B4-BE49-F238E27FC236}">
+                <a16:creationId xmlns:a16="http://schemas.microsoft.com/office/drawing/2014/main" id="{B3F2241B-5D12-47C2-8B28-5B9D9A032766}"/>
+              </a:ext>
+            </a:extLst>
+          </p:cNvPr>
+          <p:cNvPicPr>
+            <a:picLocks noChangeAspect="1"/>
+          </p:cNvPicPr>
+          <p:nvPr/>
+        </p:nvPicPr>
+        <p:blipFill>
+          <a:blip r:embed="rId6"/>
+          <a:stretch>
+            <a:fillRect/>
+          </a:stretch>
+        </p:blipFill>
+        <p:spPr>
+          <a:xfrm>
+            <a:off x="2811439" y="1977496"/>
+            <a:ext cx="1200821" cy="609600"/>
+          </a:xfrm>
+          <a:prstGeom prst="rect">
+            <a:avLst/>
+          </a:prstGeom>
+        </p:spPr>
+      </p:pic>
+      <p:pic>
+        <p:nvPicPr>
+          <p:cNvPr id="13" name="Picture 12">
+            <a:extLst>
+              <a:ext uri="{FF2B5EF4-FFF2-40B4-BE49-F238E27FC236}">
+                <a16:creationId xmlns:a16="http://schemas.microsoft.com/office/drawing/2014/main" id="{46ED4E5B-ABFF-4723-8B9B-6B6B50CA7D7E}"/>
+              </a:ext>
+            </a:extLst>
+          </p:cNvPr>
+          <p:cNvPicPr>
+            <a:picLocks noChangeAspect="1"/>
+          </p:cNvPicPr>
+          <p:nvPr/>
+        </p:nvPicPr>
+        <p:blipFill>
+          <a:blip r:embed="rId7"/>
+          <a:stretch>
+            <a:fillRect/>
+          </a:stretch>
+        </p:blipFill>
+        <p:spPr>
+          <a:xfrm>
+            <a:off x="2811439" y="2637560"/>
+            <a:ext cx="4278573" cy="740522"/>
+          </a:xfrm>
+          <a:prstGeom prst="rect">
+            <a:avLst/>
+          </a:prstGeom>
+        </p:spPr>
+      </p:pic>
+      <p:sp>
+        <p:nvSpPr>
+          <p:cNvPr id="14" name="TextBox 13">
+            <a:extLst>
+              <a:ext uri="{FF2B5EF4-FFF2-40B4-BE49-F238E27FC236}">
+                <a16:creationId xmlns:a16="http://schemas.microsoft.com/office/drawing/2014/main" id="{5275CA95-025E-4999-B082-784F65FE9EF5}"/>
+              </a:ext>
+            </a:extLst>
+          </p:cNvPr>
+          <p:cNvSpPr txBox="1"/>
+          <p:nvPr/>
+        </p:nvSpPr>
+        <p:spPr>
+          <a:xfrm>
+            <a:off x="1808328" y="0"/>
+            <a:ext cx="4387756" cy="400110"/>
+          </a:xfrm>
+          <a:prstGeom prst="rect">
+            <a:avLst/>
+          </a:prstGeom>
+          <a:noFill/>
+        </p:spPr>
+        <p:txBody>
+          <a:bodyPr wrap="square" rtlCol="0">
+            <a:spAutoFit/>
+          </a:bodyPr>
+          <a:lstStyle/>
+          <a:p>
+            <a:r>
+              <a:rPr lang="en-US" sz="2000" b="1" dirty="0">
+                <a:solidFill>
+                  <a:srgbClr val="00B050"/>
+                </a:solidFill>
+              </a:rPr>
+              <a:t>Tuned SVR Plots and Results</a:t>
+            </a:r>
+          </a:p>
+        </p:txBody>
+      </p:sp>
+    </p:spTree>
+    <p:extLst>
+      <p:ext uri="{BB962C8B-B14F-4D97-AF65-F5344CB8AC3E}">
+        <p14:creationId xmlns:p14="http://schemas.microsoft.com/office/powerpoint/2010/main" val="3099924452"/>
+      </p:ext>
+    </p:extLst>
+  </p:cSld>
+  <p:clrMapOvr>
+    <a:masterClrMapping/>
+  </p:clrMapOvr>
+</p:sld>
+</file>
+
+<file path=ppt/slides/slide25.xml><?xml version="1.0" encoding="utf-8"?>
+<p:sld xmlns:a="http://schemas.openxmlformats.org/drawingml/2006/main" xmlns:r="http://schemas.openxmlformats.org/officeDocument/2006/relationships" xmlns:p="http://schemas.openxmlformats.org/presentationml/2006/main">
+  <p:cSld>
+    <p:spTree>
+      <p:nvGrpSpPr>
+        <p:cNvPr id="1" name=""/>
+        <p:cNvGrpSpPr/>
+        <p:nvPr/>
+      </p:nvGrpSpPr>
+      <p:grpSpPr>
+        <a:xfrm>
+          <a:off x="0" y="0"/>
+          <a:ext cx="0" cy="0"/>
+          <a:chOff x="0" y="0"/>
+          <a:chExt cx="0" cy="0"/>
+        </a:xfrm>
+      </p:grpSpPr>
+      <p:sp>
+        <p:nvSpPr>
+          <p:cNvPr id="182" name="CustomShape 1"/>
+          <p:cNvSpPr/>
+          <p:nvPr/>
+        </p:nvSpPr>
+        <p:spPr>
+          <a:xfrm>
+            <a:off x="417240" y="1841400"/>
+            <a:ext cx="6336360" cy="685440"/>
+          </a:xfrm>
+          <a:prstGeom prst="rect">
+            <a:avLst/>
+          </a:prstGeom>
+          <a:noFill/>
+          <a:ln w="0">
+            <a:noFill/>
+          </a:ln>
+        </p:spPr>
+        <p:style>
+          <a:lnRef idx="0">
+            <a:scrgbClr r="0" g="0" b="0"/>
+          </a:lnRef>
+          <a:fillRef idx="0">
+            <a:scrgbClr r="0" g="0" b="0"/>
+          </a:fillRef>
+          <a:effectRef idx="0">
+            <a:scrgbClr r="0" g="0" b="0"/>
+          </a:effectRef>
+          <a:fontRef idx="minor"/>
+        </p:style>
+        <p:txBody>
+          <a:bodyPr lIns="90000" tIns="45000" rIns="90000" bIns="45000">
+            <a:noAutofit/>
+          </a:bodyPr>
+          <a:lstStyle/>
+          <a:p>
+            <a:pPr algn="ctr">
+              <a:lnSpc>
+                <a:spcPct val="100000"/>
+              </a:lnSpc>
+            </a:pPr>
+            <a:r>
+              <a:rPr lang="en-US" sz="2400" b="1" strike="noStrike" spc="-1">
+                <a:solidFill>
+                  <a:srgbClr val="1FB47C"/>
+                </a:solidFill>
+                <a:latin typeface="Arial"/>
+              </a:rPr>
+              <a:t>Thank you! </a:t>
+            </a:r>
+            <a:endParaRPr lang="en-US" sz="2400" b="0" strike="noStrike" spc="-1">
+              <a:latin typeface="Arial"/>
+            </a:endParaRPr>
+          </a:p>
+        </p:txBody>
+      </p:sp>
+      <p:sp>
+        <p:nvSpPr>
+          <p:cNvPr id="2" name="Rectangle 1">
+            <a:extLst>
+              <a:ext uri="{FF2B5EF4-FFF2-40B4-BE49-F238E27FC236}">
+                <a16:creationId xmlns:a16="http://schemas.microsoft.com/office/drawing/2014/main" id="{2515AA8B-A52B-4108-AFC4-F3F079618FF7}"/>
+              </a:ext>
+            </a:extLst>
+          </p:cNvPr>
+          <p:cNvSpPr/>
+          <p:nvPr/>
+        </p:nvSpPr>
+        <p:spPr>
+          <a:xfrm>
+            <a:off x="5661061" y="82193"/>
+            <a:ext cx="1397285" cy="685440"/>
+          </a:xfrm>
+          <a:prstGeom prst="rect">
+            <a:avLst/>
+          </a:prstGeom>
+          <a:solidFill>
+            <a:schemeClr val="bg1"/>
+          </a:solidFill>
+          <a:ln>
+            <a:solidFill>
+              <a:schemeClr val="bg1"/>
+            </a:solidFill>
+          </a:ln>
+        </p:spPr>
+        <p:style>
+          <a:lnRef idx="2">
+            <a:schemeClr val="accent1">
+              <a:shade val="50000"/>
+            </a:schemeClr>
+          </a:lnRef>
+          <a:fillRef idx="1">
+            <a:schemeClr val="accent1"/>
+          </a:fillRef>
+          <a:effectRef idx="0">
+            <a:schemeClr val="accent1"/>
+          </a:effectRef>
+          <a:fontRef idx="minor">
+            <a:schemeClr val="lt1"/>
+          </a:fontRef>
+        </p:style>
+        <p:txBody>
+          <a:bodyPr rtlCol="0" anchor="ctr"/>
+          <a:lstStyle/>
+          <a:p>
+            <a:pPr algn="ctr"/>
+            <a:endParaRPr lang="en-US"/>
+          </a:p>
+        </p:txBody>
+      </p:sp>
     </p:spTree>
   </p:cSld>
   <p:clrMapOvr>
@@ -7118,7 +8330,7 @@
         <p:spPr>
           <a:xfrm>
             <a:off x="273239" y="761400"/>
-            <a:ext cx="5932351" cy="2741400"/>
+            <a:ext cx="6230111" cy="3106604"/>
           </a:xfrm>
           <a:prstGeom prst="rect">
             <a:avLst/>
@@ -7153,23 +8365,7 @@
                   <a:srgbClr val="1778AB"/>
                 </a:solidFill>
               </a:rPr>
-              <a:t>Exploratory Data </a:t>
-            </a:r>
-            <a:r>
-              <a:rPr lang="en-US" spc="-1" dirty="0" err="1">
-                <a:solidFill>
-                  <a:srgbClr val="1778AB"/>
-                </a:solidFill>
-              </a:rPr>
-              <a:t>Anaysis</a:t>
-            </a:r>
-            <a:r>
-              <a:rPr lang="en-US" spc="-1" dirty="0">
-                <a:solidFill>
-                  <a:srgbClr val="1778AB"/>
-                </a:solidFill>
-              </a:rPr>
-              <a:t> (EDA)</a:t>
+              <a:t>Exploratory Data Analysis (EDA)</a:t>
             </a:r>
           </a:p>
           <a:p>
@@ -7232,21 +8428,8 @@
                   <a:srgbClr val="1778AB"/>
                 </a:solidFill>
               </a:rPr>
-              <a:t>K-mean </a:t>
+              <a:t>K-mean Clustering</a:t>
             </a:r>
-            <a:r>
-              <a:rPr lang="en-US" spc="-1" dirty="0" err="1">
-                <a:solidFill>
-                  <a:srgbClr val="1778AB"/>
-                </a:solidFill>
-              </a:rPr>
-              <a:t>Clusting</a:t>
-            </a:r>
-            <a:endParaRPr lang="en-US" spc="-1" dirty="0">
-              <a:solidFill>
-                <a:srgbClr val="1778AB"/>
-              </a:solidFill>
-            </a:endParaRPr>
           </a:p>
           <a:p>
             <a:pPr marL="743310" lvl="1" indent="-285750">
@@ -7285,7 +8468,7 @@
                   <a:srgbClr val="1778AB"/>
                 </a:solidFill>
               </a:rPr>
-              <a:t>Gradient Boosting and </a:t>
+              <a:t>Gradient Boosting </a:t>
             </a:r>
           </a:p>
           <a:p>

</xml_diff>